<commit_message>
add missing if-else slide
</commit_message>
<xml_diff>
--- a/Prezentace/1. ročník/PGM_04_programove_konstrukce.pptx
+++ b/Prezentace/1. ročník/PGM_04_programove_konstrukce.pptx
@@ -6,10 +6,10 @@
     <p:sldMasterId id="2147483686" r:id="rId2"/>
   </p:sldMasterIdLst>
   <p:notesMasterIdLst>
-    <p:notesMasterId r:id="rId15"/>
+    <p:notesMasterId r:id="rId16"/>
   </p:notesMasterIdLst>
   <p:handoutMasterIdLst>
-    <p:handoutMasterId r:id="rId16"/>
+    <p:handoutMasterId r:id="rId17"/>
   </p:handoutMasterIdLst>
   <p:sldIdLst>
     <p:sldId id="257" r:id="rId3"/>
@@ -18,12 +18,13 @@
     <p:sldId id="260" r:id="rId6"/>
     <p:sldId id="261" r:id="rId7"/>
     <p:sldId id="262" r:id="rId8"/>
-    <p:sldId id="263" r:id="rId9"/>
-    <p:sldId id="264" r:id="rId10"/>
-    <p:sldId id="265" r:id="rId11"/>
-    <p:sldId id="266" r:id="rId12"/>
-    <p:sldId id="268" r:id="rId13"/>
-    <p:sldId id="267" r:id="rId14"/>
+    <p:sldId id="269" r:id="rId9"/>
+    <p:sldId id="263" r:id="rId10"/>
+    <p:sldId id="264" r:id="rId11"/>
+    <p:sldId id="265" r:id="rId12"/>
+    <p:sldId id="266" r:id="rId13"/>
+    <p:sldId id="268" r:id="rId14"/>
+    <p:sldId id="267" r:id="rId15"/>
   </p:sldIdLst>
   <p:sldSz cx="12192000" cy="6858000"/>
   <p:notesSz cx="6858000" cy="9144000"/>
@@ -228,7 +229,7 @@
             <a:pPr rtl="0"/>
             <a:fld id="{FDE85DFC-B421-41EA-8DC4-3E39E5C5F29A}" type="datetime1">
               <a:rPr lang="cs-CZ" smtClean="0"/>
-              <a:t>23.09.2024</a:t>
+              <a:t>30.09.2024</a:t>
             </a:fld>
             <a:endParaRPr lang="en-US" dirty="0"/>
           </a:p>
@@ -398,7 +399,7 @@
             <a:pPr rtl="0"/>
             <a:fld id="{E2418210-470A-474B-B6D7-B54736EE8B34}" type="datetime1">
               <a:rPr lang="cs-CZ" smtClean="0"/>
-              <a:t>23.09.2024</a:t>
+              <a:t>30.09.2024</a:t>
             </a:fld>
             <a:endParaRPr lang="en-US"/>
           </a:p>
@@ -737,7 +738,7 @@
             <a:pPr rtl="0"/>
             <a:fld id="{E2418210-470A-474B-B6D7-B54736EE8B34}" type="datetime1">
               <a:rPr lang="cs-CZ" smtClean="0"/>
-              <a:t>23.09.2024</a:t>
+              <a:t>30.09.2024</a:t>
             </a:fld>
             <a:endParaRPr lang="en-US"/>
           </a:p>
@@ -846,7 +847,7 @@
             <a:pPr rtl="0"/>
             <a:fld id="{E2418210-470A-474B-B6D7-B54736EE8B34}" type="datetime1">
               <a:rPr lang="cs-CZ" smtClean="0"/>
-              <a:t>23.09.2024</a:t>
+              <a:t>30.09.2024</a:t>
             </a:fld>
             <a:endParaRPr lang="en-US"/>
           </a:p>
@@ -955,7 +956,7 @@
             <a:pPr rtl="0"/>
             <a:fld id="{E2418210-470A-474B-B6D7-B54736EE8B34}" type="datetime1">
               <a:rPr lang="cs-CZ" smtClean="0"/>
-              <a:t>23.09.2024</a:t>
+              <a:t>30.09.2024</a:t>
             </a:fld>
             <a:endParaRPr lang="en-US"/>
           </a:p>
@@ -1064,7 +1065,7 @@
             <a:pPr rtl="0"/>
             <a:fld id="{E2418210-470A-474B-B6D7-B54736EE8B34}" type="datetime1">
               <a:rPr lang="cs-CZ" smtClean="0"/>
-              <a:t>23.09.2024</a:t>
+              <a:t>30.09.2024</a:t>
             </a:fld>
             <a:endParaRPr lang="en-US"/>
           </a:p>
@@ -1097,7 +1098,7 @@
     </p:spTree>
     <p:extLst>
       <p:ext uri="{BB962C8B-B14F-4D97-AF65-F5344CB8AC3E}">
-        <p14:creationId xmlns:p14="http://schemas.microsoft.com/office/powerpoint/2010/main" val="3264089207"/>
+        <p14:creationId xmlns:p14="http://schemas.microsoft.com/office/powerpoint/2010/main" val="3083528475"/>
       </p:ext>
     </p:extLst>
   </p:cSld>
@@ -1173,7 +1174,7 @@
             <a:pPr rtl="0"/>
             <a:fld id="{E2418210-470A-474B-B6D7-B54736EE8B34}" type="datetime1">
               <a:rPr lang="cs-CZ" smtClean="0"/>
-              <a:t>23.09.2024</a:t>
+              <a:t>30.09.2024</a:t>
             </a:fld>
             <a:endParaRPr lang="en-US"/>
           </a:p>
@@ -1206,7 +1207,7 @@
     </p:spTree>
     <p:extLst>
       <p:ext uri="{BB962C8B-B14F-4D97-AF65-F5344CB8AC3E}">
-        <p14:creationId xmlns:p14="http://schemas.microsoft.com/office/powerpoint/2010/main" val="2573422782"/>
+        <p14:creationId xmlns:p14="http://schemas.microsoft.com/office/powerpoint/2010/main" val="3264089207"/>
       </p:ext>
     </p:extLst>
   </p:cSld>
@@ -1282,7 +1283,7 @@
             <a:pPr rtl="0"/>
             <a:fld id="{E2418210-470A-474B-B6D7-B54736EE8B34}" type="datetime1">
               <a:rPr lang="cs-CZ" smtClean="0"/>
-              <a:t>23.09.2024</a:t>
+              <a:t>30.09.2024</a:t>
             </a:fld>
             <a:endParaRPr lang="en-US"/>
           </a:p>
@@ -1307,6 +1308,115 @@
             <a:fld id="{37A705E3-E620-489D-9973-6221209A4B3B}" type="slidenum">
               <a:rPr lang="en-US" smtClean="0"/>
               <a:t>9</a:t>
+            </a:fld>
+            <a:endParaRPr lang="en-US"/>
+          </a:p>
+        </p:txBody>
+      </p:sp>
+    </p:spTree>
+    <p:extLst>
+      <p:ext uri="{BB962C8B-B14F-4D97-AF65-F5344CB8AC3E}">
+        <p14:creationId xmlns:p14="http://schemas.microsoft.com/office/powerpoint/2010/main" val="2573422782"/>
+      </p:ext>
+    </p:extLst>
+  </p:cSld>
+  <p:clrMapOvr>
+    <a:masterClrMapping/>
+  </p:clrMapOvr>
+</p:notes>
+</file>
+
+<file path=ppt/notesSlides/notesSlide7.xml><?xml version="1.0" encoding="utf-8"?>
+<p:notes xmlns:a="http://schemas.openxmlformats.org/drawingml/2006/main" xmlns:r="http://schemas.openxmlformats.org/officeDocument/2006/relationships" xmlns:p="http://schemas.openxmlformats.org/presentationml/2006/main">
+  <p:cSld>
+    <p:spTree>
+      <p:nvGrpSpPr>
+        <p:cNvPr id="1" name=""/>
+        <p:cNvGrpSpPr/>
+        <p:nvPr/>
+      </p:nvGrpSpPr>
+      <p:grpSpPr>
+        <a:xfrm>
+          <a:off x="0" y="0"/>
+          <a:ext cx="0" cy="0"/>
+          <a:chOff x="0" y="0"/>
+          <a:chExt cx="0" cy="0"/>
+        </a:xfrm>
+      </p:grpSpPr>
+      <p:sp>
+        <p:nvSpPr>
+          <p:cNvPr id="2" name="Zástupný symbol pro obrázek snímku 1"/>
+          <p:cNvSpPr>
+            <a:spLocks noGrp="1" noRot="1" noChangeAspect="1"/>
+          </p:cNvSpPr>
+          <p:nvPr>
+            <p:ph type="sldImg"/>
+          </p:nvPr>
+        </p:nvSpPr>
+        <p:spPr/>
+      </p:sp>
+      <p:sp>
+        <p:nvSpPr>
+          <p:cNvPr id="3" name="Zástupný symbol pro poznámky 2"/>
+          <p:cNvSpPr>
+            <a:spLocks noGrp="1"/>
+          </p:cNvSpPr>
+          <p:nvPr>
+            <p:ph type="body" idx="1"/>
+          </p:nvPr>
+        </p:nvSpPr>
+        <p:spPr/>
+        <p:txBody>
+          <a:bodyPr/>
+          <a:lstStyle/>
+          <a:p>
+            <a:endParaRPr lang="cs-CZ" dirty="0"/>
+          </a:p>
+        </p:txBody>
+      </p:sp>
+      <p:sp>
+        <p:nvSpPr>
+          <p:cNvPr id="4" name="Zástupný symbol pro datum 3"/>
+          <p:cNvSpPr>
+            <a:spLocks noGrp="1"/>
+          </p:cNvSpPr>
+          <p:nvPr>
+            <p:ph type="dt" idx="1"/>
+          </p:nvPr>
+        </p:nvSpPr>
+        <p:spPr/>
+        <p:txBody>
+          <a:bodyPr/>
+          <a:lstStyle/>
+          <a:p>
+            <a:pPr rtl="0"/>
+            <a:fld id="{E2418210-470A-474B-B6D7-B54736EE8B34}" type="datetime1">
+              <a:rPr lang="cs-CZ" smtClean="0"/>
+              <a:t>30.09.2024</a:t>
+            </a:fld>
+            <a:endParaRPr lang="en-US"/>
+          </a:p>
+        </p:txBody>
+      </p:sp>
+      <p:sp>
+        <p:nvSpPr>
+          <p:cNvPr id="5" name="Zástupný symbol pro číslo snímku 4"/>
+          <p:cNvSpPr>
+            <a:spLocks noGrp="1"/>
+          </p:cNvSpPr>
+          <p:nvPr>
+            <p:ph type="sldNum" sz="quarter" idx="5"/>
+          </p:nvPr>
+        </p:nvSpPr>
+        <p:spPr/>
+        <p:txBody>
+          <a:bodyPr/>
+          <a:lstStyle/>
+          <a:p>
+            <a:pPr rtl="0"/>
+            <a:fld id="{37A705E3-E620-489D-9973-6221209A4B3B}" type="slidenum">
+              <a:rPr lang="en-US" smtClean="0"/>
+              <a:t>10</a:t>
             </a:fld>
             <a:endParaRPr lang="en-US"/>
           </a:p>
@@ -8379,6 +8489,842 @@
           <a:chExt cx="0" cy="0"/>
         </a:xfrm>
       </p:grpSpPr>
+      <p:sp>
+        <p:nvSpPr>
+          <p:cNvPr id="12" name="Obdélník 11">
+            <a:extLst>
+              <a:ext uri="{FF2B5EF4-FFF2-40B4-BE49-F238E27FC236}">
+                <a16:creationId xmlns:a16="http://schemas.microsoft.com/office/drawing/2014/main" id="{2CF9DBEA-64DB-4586-D032-385BC104CA07}"/>
+              </a:ext>
+            </a:extLst>
+          </p:cNvPr>
+          <p:cNvSpPr/>
+          <p:nvPr/>
+        </p:nvSpPr>
+        <p:spPr>
+          <a:xfrm>
+            <a:off x="6064625" y="2505075"/>
+            <a:ext cx="5565401" cy="3796272"/>
+          </a:xfrm>
+          <a:prstGeom prst="rect">
+            <a:avLst/>
+          </a:prstGeom>
+          <a:solidFill>
+            <a:schemeClr val="bg1"/>
+          </a:solidFill>
+          <a:ln>
+            <a:solidFill>
+              <a:schemeClr val="bg1"/>
+            </a:solidFill>
+          </a:ln>
+          <a:effectLst>
+            <a:outerShdw blurRad="50800" dist="38100" dir="2700000" algn="tl" rotWithShape="0">
+              <a:prstClr val="black">
+                <a:alpha val="30000"/>
+              </a:prstClr>
+            </a:outerShdw>
+          </a:effectLst>
+        </p:spPr>
+        <p:style>
+          <a:lnRef idx="2">
+            <a:schemeClr val="accent1">
+              <a:shade val="15000"/>
+            </a:schemeClr>
+          </a:lnRef>
+          <a:fillRef idx="1">
+            <a:schemeClr val="accent1"/>
+          </a:fillRef>
+          <a:effectRef idx="0">
+            <a:schemeClr val="accent1"/>
+          </a:effectRef>
+          <a:fontRef idx="minor">
+            <a:schemeClr val="lt1"/>
+          </a:fontRef>
+        </p:style>
+        <p:txBody>
+          <a:bodyPr rtlCol="0" anchor="ctr"/>
+          <a:lstStyle/>
+          <a:p>
+            <a:pPr algn="ctr"/>
+            <a:endParaRPr lang="cs-CZ"/>
+          </a:p>
+        </p:txBody>
+      </p:sp>
+      <p:sp>
+        <p:nvSpPr>
+          <p:cNvPr id="2" name="Nadpis 1">
+            <a:extLst>
+              <a:ext uri="{FF2B5EF4-FFF2-40B4-BE49-F238E27FC236}">
+                <a16:creationId xmlns:a16="http://schemas.microsoft.com/office/drawing/2014/main" id="{5B48777E-3CF5-7678-00C9-6DF828D31DFB}"/>
+              </a:ext>
+            </a:extLst>
+          </p:cNvPr>
+          <p:cNvSpPr>
+            <a:spLocks noGrp="1"/>
+          </p:cNvSpPr>
+          <p:nvPr>
+            <p:ph type="title"/>
+          </p:nvPr>
+        </p:nvSpPr>
+        <p:spPr/>
+        <p:txBody>
+          <a:bodyPr anchor="b">
+            <a:normAutofit/>
+          </a:bodyPr>
+          <a:lstStyle/>
+          <a:p>
+            <a:r>
+              <a:rPr lang="cs-CZ" sz="5400" dirty="0"/>
+              <a:t>Cyklus s pevným počtem opakování</a:t>
+            </a:r>
+          </a:p>
+        </p:txBody>
+      </p:sp>
+      <p:sp>
+        <p:nvSpPr>
+          <p:cNvPr id="5" name="Zástupný text 4">
+            <a:extLst>
+              <a:ext uri="{FF2B5EF4-FFF2-40B4-BE49-F238E27FC236}">
+                <a16:creationId xmlns:a16="http://schemas.microsoft.com/office/drawing/2014/main" id="{9AEAFE9C-B203-67A1-8AAA-7338D245A232}"/>
+              </a:ext>
+            </a:extLst>
+          </p:cNvPr>
+          <p:cNvSpPr>
+            <a:spLocks noGrp="1"/>
+          </p:cNvSpPr>
+          <p:nvPr>
+            <p:ph type="body" idx="1"/>
+          </p:nvPr>
+        </p:nvSpPr>
+        <p:spPr/>
+        <p:txBody>
+          <a:bodyPr/>
+          <a:lstStyle/>
+          <a:p>
+            <a:pPr algn="ctr"/>
+            <a:r>
+              <a:rPr lang="cs-CZ" dirty="0"/>
+              <a:t>Vývojový diagram</a:t>
+            </a:r>
+          </a:p>
+        </p:txBody>
+      </p:sp>
+      <p:sp>
+        <p:nvSpPr>
+          <p:cNvPr id="8" name="Zástupný text 7">
+            <a:extLst>
+              <a:ext uri="{FF2B5EF4-FFF2-40B4-BE49-F238E27FC236}">
+                <a16:creationId xmlns:a16="http://schemas.microsoft.com/office/drawing/2014/main" id="{9B11E3BB-75DF-B3AB-E992-11FCEE1AFF06}"/>
+              </a:ext>
+            </a:extLst>
+          </p:cNvPr>
+          <p:cNvSpPr>
+            <a:spLocks noGrp="1"/>
+          </p:cNvSpPr>
+          <p:nvPr>
+            <p:ph type="body" sz="quarter" idx="3"/>
+          </p:nvPr>
+        </p:nvSpPr>
+        <p:spPr/>
+        <p:txBody>
+          <a:bodyPr/>
+          <a:lstStyle/>
+          <a:p>
+            <a:pPr algn="ctr"/>
+            <a:r>
+              <a:rPr lang="cs-CZ" dirty="0"/>
+              <a:t>C#</a:t>
+            </a:r>
+          </a:p>
+        </p:txBody>
+      </p:sp>
+      <p:sp>
+        <p:nvSpPr>
+          <p:cNvPr id="9" name="Zástupný obsah 8">
+            <a:extLst>
+              <a:ext uri="{FF2B5EF4-FFF2-40B4-BE49-F238E27FC236}">
+                <a16:creationId xmlns:a16="http://schemas.microsoft.com/office/drawing/2014/main" id="{9268AC46-C003-E17C-EB82-408DF536BDB8}"/>
+              </a:ext>
+            </a:extLst>
+          </p:cNvPr>
+          <p:cNvSpPr>
+            <a:spLocks noGrp="1"/>
+          </p:cNvSpPr>
+          <p:nvPr>
+            <p:ph sz="quarter" idx="4"/>
+          </p:nvPr>
+        </p:nvSpPr>
+        <p:spPr>
+          <a:xfrm>
+            <a:off x="6172200" y="2610269"/>
+            <a:ext cx="5457826" cy="3684588"/>
+          </a:xfrm>
+        </p:spPr>
+        <p:txBody>
+          <a:bodyPr>
+            <a:normAutofit/>
+          </a:bodyPr>
+          <a:lstStyle/>
+          <a:p>
+            <a:pPr marL="0" indent="0">
+              <a:buNone/>
+            </a:pPr>
+            <a:endParaRPr lang="cs-CZ" sz="1600" dirty="0">
+              <a:solidFill>
+                <a:srgbClr val="0000FF"/>
+              </a:solidFill>
+              <a:latin typeface="Consolas" panose="020B0609020204030204" pitchFamily="49" charset="0"/>
+            </a:endParaRPr>
+          </a:p>
+          <a:p>
+            <a:pPr marL="0" indent="0">
+              <a:buNone/>
+            </a:pPr>
+            <a:endParaRPr lang="cs-CZ" sz="1600" dirty="0">
+              <a:solidFill>
+                <a:srgbClr val="0000FF"/>
+              </a:solidFill>
+              <a:latin typeface="Consolas" panose="020B0609020204030204" pitchFamily="49" charset="0"/>
+            </a:endParaRPr>
+          </a:p>
+          <a:p>
+            <a:pPr marL="0" indent="0">
+              <a:buNone/>
+            </a:pPr>
+            <a:endParaRPr lang="cs-CZ" sz="1600" dirty="0">
+              <a:solidFill>
+                <a:srgbClr val="0000FF"/>
+              </a:solidFill>
+              <a:latin typeface="Consolas" panose="020B0609020204030204" pitchFamily="49" charset="0"/>
+            </a:endParaRPr>
+          </a:p>
+          <a:p>
+            <a:pPr marL="0" indent="0">
+              <a:buNone/>
+            </a:pPr>
+            <a:r>
+              <a:rPr lang="cs-CZ" sz="1600" dirty="0" err="1">
+                <a:solidFill>
+                  <a:srgbClr val="0000FF"/>
+                </a:solidFill>
+                <a:latin typeface="Consolas" panose="020B0609020204030204" pitchFamily="49" charset="0"/>
+              </a:rPr>
+              <a:t>for</a:t>
+            </a:r>
+            <a:r>
+              <a:rPr lang="cs-CZ" sz="1600" dirty="0">
+                <a:solidFill>
+                  <a:srgbClr val="0000FF"/>
+                </a:solidFill>
+                <a:latin typeface="Consolas" panose="020B0609020204030204" pitchFamily="49" charset="0"/>
+              </a:rPr>
+              <a:t> </a:t>
+            </a:r>
+            <a:r>
+              <a:rPr lang="cs-CZ" sz="1600" dirty="0">
+                <a:solidFill>
+                  <a:srgbClr val="000000"/>
+                </a:solidFill>
+                <a:latin typeface="Consolas" panose="020B0609020204030204" pitchFamily="49" charset="0"/>
+              </a:rPr>
+              <a:t>(</a:t>
+            </a:r>
+            <a:r>
+              <a:rPr lang="cs-CZ" sz="1600" dirty="0" err="1">
+                <a:solidFill>
+                  <a:srgbClr val="000000"/>
+                </a:solidFill>
+                <a:latin typeface="Consolas" panose="020B0609020204030204" pitchFamily="49" charset="0"/>
+              </a:rPr>
+              <a:t>int</a:t>
+            </a:r>
+            <a:r>
+              <a:rPr lang="cs-CZ" sz="1600" dirty="0">
+                <a:solidFill>
+                  <a:srgbClr val="000000"/>
+                </a:solidFill>
+                <a:latin typeface="Consolas" panose="020B0609020204030204" pitchFamily="49" charset="0"/>
+              </a:rPr>
+              <a:t> i = 0; i &lt; N; i++)</a:t>
+            </a:r>
+            <a:endParaRPr lang="cs-CZ" sz="1600" dirty="0">
+              <a:solidFill>
+                <a:srgbClr val="0000FF"/>
+              </a:solidFill>
+              <a:latin typeface="Consolas" panose="020B0609020204030204" pitchFamily="49" charset="0"/>
+            </a:endParaRPr>
+          </a:p>
+          <a:p>
+            <a:pPr marL="0" indent="0">
+              <a:buNone/>
+            </a:pPr>
+            <a:r>
+              <a:rPr lang="cs-CZ" sz="1600" dirty="0">
+                <a:solidFill>
+                  <a:srgbClr val="000000"/>
+                </a:solidFill>
+                <a:latin typeface="Consolas" panose="020B0609020204030204" pitchFamily="49" charset="0"/>
+              </a:rPr>
+              <a:t>{  </a:t>
+            </a:r>
+          </a:p>
+          <a:p>
+            <a:pPr marL="0" indent="0">
+              <a:buNone/>
+            </a:pPr>
+            <a:endParaRPr lang="cs-CZ" sz="1600" dirty="0">
+              <a:solidFill>
+                <a:srgbClr val="000000"/>
+              </a:solidFill>
+              <a:latin typeface="Consolas" panose="020B0609020204030204" pitchFamily="49" charset="0"/>
+            </a:endParaRPr>
+          </a:p>
+          <a:p>
+            <a:pPr marL="0" indent="0">
+              <a:buNone/>
+            </a:pPr>
+            <a:endParaRPr lang="cs-CZ" sz="1600" dirty="0">
+              <a:solidFill>
+                <a:srgbClr val="000000"/>
+              </a:solidFill>
+              <a:latin typeface="Consolas" panose="020B0609020204030204" pitchFamily="49" charset="0"/>
+            </a:endParaRPr>
+          </a:p>
+          <a:p>
+            <a:pPr marL="0" indent="0">
+              <a:buNone/>
+            </a:pPr>
+            <a:endParaRPr lang="cs-CZ" sz="1600" dirty="0">
+              <a:solidFill>
+                <a:srgbClr val="000000"/>
+              </a:solidFill>
+              <a:latin typeface="Consolas" panose="020B0609020204030204" pitchFamily="49" charset="0"/>
+            </a:endParaRPr>
+          </a:p>
+          <a:p>
+            <a:pPr marL="0" indent="0">
+              <a:buNone/>
+            </a:pPr>
+            <a:r>
+              <a:rPr lang="cs-CZ" sz="1600" dirty="0">
+                <a:solidFill>
+                  <a:srgbClr val="000000"/>
+                </a:solidFill>
+                <a:latin typeface="Consolas" panose="020B0609020204030204" pitchFamily="49" charset="0"/>
+              </a:rPr>
+              <a:t>     </a:t>
+            </a:r>
+            <a:r>
+              <a:rPr lang="cs-CZ" sz="1600" dirty="0">
+                <a:solidFill>
+                  <a:srgbClr val="008000"/>
+                </a:solidFill>
+                <a:latin typeface="Consolas" panose="020B0609020204030204" pitchFamily="49" charset="0"/>
+              </a:rPr>
+              <a:t>// VYKONEJ</a:t>
+            </a:r>
+            <a:endParaRPr lang="cs-CZ" sz="1600" dirty="0">
+              <a:solidFill>
+                <a:srgbClr val="000000"/>
+              </a:solidFill>
+              <a:latin typeface="Consolas" panose="020B0609020204030204" pitchFamily="49" charset="0"/>
+            </a:endParaRPr>
+          </a:p>
+          <a:p>
+            <a:pPr marL="0" indent="0">
+              <a:buNone/>
+            </a:pPr>
+            <a:r>
+              <a:rPr lang="cs-CZ" sz="1600" dirty="0">
+                <a:solidFill>
+                  <a:srgbClr val="000000"/>
+                </a:solidFill>
+                <a:latin typeface="Consolas" panose="020B0609020204030204" pitchFamily="49" charset="0"/>
+              </a:rPr>
+              <a:t>}</a:t>
+            </a:r>
+          </a:p>
+          <a:p>
+            <a:pPr marL="0" indent="0">
+              <a:buNone/>
+            </a:pPr>
+            <a:endParaRPr lang="cs-CZ" sz="2400" dirty="0"/>
+          </a:p>
+        </p:txBody>
+      </p:sp>
+      <p:sp>
+        <p:nvSpPr>
+          <p:cNvPr id="4" name="Zástupný symbol pro číslo snímku 3">
+            <a:extLst>
+              <a:ext uri="{FF2B5EF4-FFF2-40B4-BE49-F238E27FC236}">
+                <a16:creationId xmlns:a16="http://schemas.microsoft.com/office/drawing/2014/main" id="{3CE1C585-EBCF-8717-C2DD-044A3C84E128}"/>
+              </a:ext>
+            </a:extLst>
+          </p:cNvPr>
+          <p:cNvSpPr>
+            <a:spLocks noGrp="1"/>
+          </p:cNvSpPr>
+          <p:nvPr>
+            <p:ph type="sldNum" sz="quarter" idx="12"/>
+          </p:nvPr>
+        </p:nvSpPr>
+        <p:spPr/>
+        <p:txBody>
+          <a:bodyPr>
+            <a:normAutofit/>
+          </a:bodyPr>
+          <a:lstStyle/>
+          <a:p>
+            <a:pPr rtl="0">
+              <a:spcAft>
+                <a:spcPts val="600"/>
+              </a:spcAft>
+            </a:pPr>
+            <a:fld id="{34B7E4EF-A1BD-40F4-AB7B-04F084DD991D}" type="slidenum">
+              <a:rPr lang="en-US" smtClean="0"/>
+              <a:pPr rtl="0">
+                <a:spcAft>
+                  <a:spcPts val="600"/>
+                </a:spcAft>
+              </a:pPr>
+              <a:t>10</a:t>
+            </a:fld>
+            <a:endParaRPr lang="en-US"/>
+          </a:p>
+        </p:txBody>
+      </p:sp>
+      <p:sp>
+        <p:nvSpPr>
+          <p:cNvPr id="11" name="Obdélník 10">
+            <a:extLst>
+              <a:ext uri="{FF2B5EF4-FFF2-40B4-BE49-F238E27FC236}">
+                <a16:creationId xmlns:a16="http://schemas.microsoft.com/office/drawing/2014/main" id="{00CA8143-15BB-6030-8E23-99AE26FABAF1}"/>
+              </a:ext>
+            </a:extLst>
+          </p:cNvPr>
+          <p:cNvSpPr/>
+          <p:nvPr/>
+        </p:nvSpPr>
+        <p:spPr>
+          <a:xfrm>
+            <a:off x="730491" y="2505074"/>
+            <a:ext cx="4809697" cy="3789783"/>
+          </a:xfrm>
+          <a:prstGeom prst="rect">
+            <a:avLst/>
+          </a:prstGeom>
+          <a:solidFill>
+            <a:schemeClr val="bg1"/>
+          </a:solidFill>
+          <a:ln>
+            <a:solidFill>
+              <a:schemeClr val="bg1"/>
+            </a:solidFill>
+          </a:ln>
+          <a:effectLst>
+            <a:outerShdw blurRad="50800" dist="38100" dir="2700000" algn="tl" rotWithShape="0">
+              <a:prstClr val="black">
+                <a:alpha val="30000"/>
+              </a:prstClr>
+            </a:outerShdw>
+          </a:effectLst>
+        </p:spPr>
+        <p:style>
+          <a:lnRef idx="2">
+            <a:schemeClr val="accent1">
+              <a:shade val="15000"/>
+            </a:schemeClr>
+          </a:lnRef>
+          <a:fillRef idx="1">
+            <a:schemeClr val="accent1"/>
+          </a:fillRef>
+          <a:effectRef idx="0">
+            <a:schemeClr val="accent1"/>
+          </a:effectRef>
+          <a:fontRef idx="minor">
+            <a:schemeClr val="lt1"/>
+          </a:fontRef>
+        </p:style>
+        <p:txBody>
+          <a:bodyPr rtlCol="0" anchor="ctr"/>
+          <a:lstStyle/>
+          <a:p>
+            <a:pPr algn="ctr"/>
+            <a:endParaRPr lang="cs-CZ"/>
+          </a:p>
+        </p:txBody>
+      </p:sp>
+      <p:sp>
+        <p:nvSpPr>
+          <p:cNvPr id="13" name="Obdélník 12">
+            <a:extLst>
+              <a:ext uri="{FF2B5EF4-FFF2-40B4-BE49-F238E27FC236}">
+                <a16:creationId xmlns:a16="http://schemas.microsoft.com/office/drawing/2014/main" id="{48A92B48-637C-77AA-8B20-1D8206766344}"/>
+              </a:ext>
+            </a:extLst>
+          </p:cNvPr>
+          <p:cNvSpPr/>
+          <p:nvPr/>
+        </p:nvSpPr>
+        <p:spPr>
+          <a:xfrm>
+            <a:off x="-497673" y="1795882"/>
+            <a:ext cx="12127699" cy="230141"/>
+          </a:xfrm>
+          <a:prstGeom prst="rect">
+            <a:avLst/>
+          </a:prstGeom>
+          <a:solidFill>
+            <a:srgbClr val="0F9ED5"/>
+          </a:solidFill>
+          <a:ln>
+            <a:noFill/>
+          </a:ln>
+        </p:spPr>
+        <p:style>
+          <a:lnRef idx="2">
+            <a:schemeClr val="accent4">
+              <a:shade val="15000"/>
+            </a:schemeClr>
+          </a:lnRef>
+          <a:fillRef idx="1">
+            <a:schemeClr val="accent4"/>
+          </a:fillRef>
+          <a:effectRef idx="0">
+            <a:schemeClr val="accent4"/>
+          </a:effectRef>
+          <a:fontRef idx="minor">
+            <a:schemeClr val="lt1"/>
+          </a:fontRef>
+        </p:style>
+        <p:txBody>
+          <a:bodyPr rtlCol="0" anchor="ctr"/>
+          <a:lstStyle/>
+          <a:p>
+            <a:pPr algn="ctr"/>
+            <a:endParaRPr lang="cs-CZ"/>
+          </a:p>
+        </p:txBody>
+      </p:sp>
+      <p:sp>
+        <p:nvSpPr>
+          <p:cNvPr id="14" name="Obdélník 13">
+            <a:extLst>
+              <a:ext uri="{FF2B5EF4-FFF2-40B4-BE49-F238E27FC236}">
+                <a16:creationId xmlns:a16="http://schemas.microsoft.com/office/drawing/2014/main" id="{F8D65509-5C6B-9614-4110-41DA1C35B508}"/>
+              </a:ext>
+            </a:extLst>
+          </p:cNvPr>
+          <p:cNvSpPr/>
+          <p:nvPr/>
+        </p:nvSpPr>
+        <p:spPr>
+          <a:xfrm>
+            <a:off x="11703143" y="1795882"/>
+            <a:ext cx="641257" cy="230141"/>
+          </a:xfrm>
+          <a:prstGeom prst="rect">
+            <a:avLst/>
+          </a:prstGeom>
+          <a:solidFill>
+            <a:srgbClr val="0F9ED5"/>
+          </a:solidFill>
+          <a:ln>
+            <a:noFill/>
+          </a:ln>
+        </p:spPr>
+        <p:style>
+          <a:lnRef idx="2">
+            <a:schemeClr val="accent4">
+              <a:shade val="15000"/>
+            </a:schemeClr>
+          </a:lnRef>
+          <a:fillRef idx="1">
+            <a:schemeClr val="accent4"/>
+          </a:fillRef>
+          <a:effectRef idx="0">
+            <a:schemeClr val="accent4"/>
+          </a:effectRef>
+          <a:fontRef idx="minor">
+            <a:schemeClr val="lt1"/>
+          </a:fontRef>
+        </p:style>
+        <p:txBody>
+          <a:bodyPr rtlCol="0" anchor="ctr"/>
+          <a:lstStyle/>
+          <a:p>
+            <a:pPr algn="ctr"/>
+            <a:endParaRPr lang="cs-CZ"/>
+          </a:p>
+        </p:txBody>
+      </p:sp>
+      <p:sp>
+        <p:nvSpPr>
+          <p:cNvPr id="6" name="Zástupný obsah 5">
+            <a:extLst>
+              <a:ext uri="{FF2B5EF4-FFF2-40B4-BE49-F238E27FC236}">
+                <a16:creationId xmlns:a16="http://schemas.microsoft.com/office/drawing/2014/main" id="{CEAC1105-5119-B27E-251D-B39D5561934F}"/>
+              </a:ext>
+            </a:extLst>
+          </p:cNvPr>
+          <p:cNvSpPr>
+            <a:spLocks noGrp="1"/>
+          </p:cNvSpPr>
+          <p:nvPr>
+            <p:ph sz="half" idx="2"/>
+          </p:nvPr>
+        </p:nvSpPr>
+        <p:spPr/>
+        <p:txBody>
+          <a:bodyPr>
+            <a:normAutofit/>
+          </a:bodyPr>
+          <a:lstStyle/>
+          <a:p>
+            <a:endParaRPr lang="cs-CZ" dirty="0"/>
+          </a:p>
+          <a:p>
+            <a:endParaRPr lang="cs-CZ" dirty="0"/>
+          </a:p>
+          <a:p>
+            <a:endParaRPr lang="cs-CZ" dirty="0"/>
+          </a:p>
+          <a:p>
+            <a:endParaRPr lang="cs-CZ" dirty="0"/>
+          </a:p>
+          <a:p>
+            <a:endParaRPr lang="cs-CZ" dirty="0"/>
+          </a:p>
+          <a:p>
+            <a:endParaRPr lang="cs-CZ" dirty="0"/>
+          </a:p>
+        </p:txBody>
+      </p:sp>
+      <p:pic>
+        <p:nvPicPr>
+          <p:cNvPr id="3" name="Zástupný obsah 8">
+            <a:extLst>
+              <a:ext uri="{FF2B5EF4-FFF2-40B4-BE49-F238E27FC236}">
+                <a16:creationId xmlns:a16="http://schemas.microsoft.com/office/drawing/2014/main" id="{AB1E5F41-FBE1-C0CE-D530-05B4E39B9B87}"/>
+              </a:ext>
+            </a:extLst>
+          </p:cNvPr>
+          <p:cNvPicPr>
+            <a:picLocks noChangeAspect="1"/>
+          </p:cNvPicPr>
+          <p:nvPr/>
+        </p:nvPicPr>
+        <p:blipFill>
+          <a:blip r:embed="rId3"/>
+          <a:stretch>
+            <a:fillRect/>
+          </a:stretch>
+        </p:blipFill>
+        <p:spPr>
+          <a:xfrm>
+            <a:off x="1373214" y="2938088"/>
+            <a:ext cx="3524250" cy="3028950"/>
+          </a:xfrm>
+          <a:prstGeom prst="rect">
+            <a:avLst/>
+          </a:prstGeom>
+        </p:spPr>
+      </p:pic>
+      <p:sp>
+        <p:nvSpPr>
+          <p:cNvPr id="10" name="Bublinový popisek: se šipkou dolů 9">
+            <a:extLst>
+              <a:ext uri="{FF2B5EF4-FFF2-40B4-BE49-F238E27FC236}">
+                <a16:creationId xmlns:a16="http://schemas.microsoft.com/office/drawing/2014/main" id="{70B6ED33-38F1-4863-7A49-2CCF3BA022D6}"/>
+              </a:ext>
+            </a:extLst>
+          </p:cNvPr>
+          <p:cNvSpPr/>
+          <p:nvPr/>
+        </p:nvSpPr>
+        <p:spPr>
+          <a:xfrm>
+            <a:off x="6096000" y="2555266"/>
+            <a:ext cx="2357718" cy="1138193"/>
+          </a:xfrm>
+          <a:prstGeom prst="downArrowCallout">
+            <a:avLst>
+              <a:gd name="adj1" fmla="val 12398"/>
+              <a:gd name="adj2" fmla="val 16336"/>
+              <a:gd name="adj3" fmla="val 18699"/>
+              <a:gd name="adj4" fmla="val 72066"/>
+            </a:avLst>
+          </a:prstGeom>
+        </p:spPr>
+        <p:style>
+          <a:lnRef idx="2">
+            <a:schemeClr val="accent1">
+              <a:shade val="15000"/>
+            </a:schemeClr>
+          </a:lnRef>
+          <a:fillRef idx="1">
+            <a:schemeClr val="accent1"/>
+          </a:fillRef>
+          <a:effectRef idx="0">
+            <a:schemeClr val="accent1"/>
+          </a:effectRef>
+          <a:fontRef idx="minor">
+            <a:schemeClr val="lt1"/>
+          </a:fontRef>
+        </p:style>
+        <p:txBody>
+          <a:bodyPr rtlCol="0" anchor="ctr"/>
+          <a:lstStyle/>
+          <a:p>
+            <a:pPr algn="ctr"/>
+            <a:r>
+              <a:rPr lang="cs-CZ" dirty="0"/>
+              <a:t>Deklarace a inicializace řídící proměnné</a:t>
+            </a:r>
+          </a:p>
+        </p:txBody>
+      </p:sp>
+      <p:sp>
+        <p:nvSpPr>
+          <p:cNvPr id="16" name="Bublinový popisek: se šipkou nahoru 15">
+            <a:extLst>
+              <a:ext uri="{FF2B5EF4-FFF2-40B4-BE49-F238E27FC236}">
+                <a16:creationId xmlns:a16="http://schemas.microsoft.com/office/drawing/2014/main" id="{76005504-F951-BCD9-3DC9-6FA2D454F9AD}"/>
+              </a:ext>
+            </a:extLst>
+          </p:cNvPr>
+          <p:cNvSpPr/>
+          <p:nvPr/>
+        </p:nvSpPr>
+        <p:spPr>
+          <a:xfrm>
+            <a:off x="7059707" y="3942390"/>
+            <a:ext cx="2357718" cy="1051767"/>
+          </a:xfrm>
+          <a:prstGeom prst="upArrowCallout">
+            <a:avLst/>
+          </a:prstGeom>
+        </p:spPr>
+        <p:style>
+          <a:lnRef idx="2">
+            <a:schemeClr val="accent1">
+              <a:shade val="15000"/>
+            </a:schemeClr>
+          </a:lnRef>
+          <a:fillRef idx="1">
+            <a:schemeClr val="accent1"/>
+          </a:fillRef>
+          <a:effectRef idx="0">
+            <a:schemeClr val="accent1"/>
+          </a:effectRef>
+          <a:fontRef idx="minor">
+            <a:schemeClr val="lt1"/>
+          </a:fontRef>
+        </p:style>
+        <p:txBody>
+          <a:bodyPr rtlCol="0" anchor="ctr"/>
+          <a:lstStyle/>
+          <a:p>
+            <a:pPr algn="ctr"/>
+            <a:r>
+              <a:rPr lang="cs-CZ" dirty="0"/>
+              <a:t>Podmínka vztažená k řídící proměnné</a:t>
+            </a:r>
+          </a:p>
+        </p:txBody>
+      </p:sp>
+      <p:sp>
+        <p:nvSpPr>
+          <p:cNvPr id="17" name="Bublinový popisek: se šipkou doleva 16">
+            <a:extLst>
+              <a:ext uri="{FF2B5EF4-FFF2-40B4-BE49-F238E27FC236}">
+                <a16:creationId xmlns:a16="http://schemas.microsoft.com/office/drawing/2014/main" id="{73F58310-22B2-E41E-08D2-C31FC32C0ED7}"/>
+              </a:ext>
+            </a:extLst>
+          </p:cNvPr>
+          <p:cNvSpPr/>
+          <p:nvPr/>
+        </p:nvSpPr>
+        <p:spPr>
+          <a:xfrm>
+            <a:off x="9341225" y="2938088"/>
+            <a:ext cx="1846728" cy="1698650"/>
+          </a:xfrm>
+          <a:prstGeom prst="leftArrowCallout">
+            <a:avLst>
+              <a:gd name="adj1" fmla="val 17457"/>
+              <a:gd name="adj2" fmla="val 16702"/>
+              <a:gd name="adj3" fmla="val 12176"/>
+              <a:gd name="adj4" fmla="val 64977"/>
+            </a:avLst>
+          </a:prstGeom>
+        </p:spPr>
+        <p:style>
+          <a:lnRef idx="2">
+            <a:schemeClr val="accent1">
+              <a:shade val="15000"/>
+            </a:schemeClr>
+          </a:lnRef>
+          <a:fillRef idx="1">
+            <a:schemeClr val="accent1"/>
+          </a:fillRef>
+          <a:effectRef idx="0">
+            <a:schemeClr val="accent1"/>
+          </a:effectRef>
+          <a:fontRef idx="minor">
+            <a:schemeClr val="lt1"/>
+          </a:fontRef>
+        </p:style>
+        <p:txBody>
+          <a:bodyPr rtlCol="0" anchor="ctr"/>
+          <a:lstStyle/>
+          <a:p>
+            <a:pPr algn="ctr"/>
+            <a:r>
+              <a:rPr lang="cs-CZ" dirty="0"/>
+              <a:t>Editace řídící proměnné</a:t>
+            </a:r>
+          </a:p>
+        </p:txBody>
+      </p:sp>
+    </p:spTree>
+    <p:extLst>
+      <p:ext uri="{BB962C8B-B14F-4D97-AF65-F5344CB8AC3E}">
+        <p14:creationId xmlns:p14="http://schemas.microsoft.com/office/powerpoint/2010/main" val="2141335822"/>
+      </p:ext>
+    </p:extLst>
+  </p:cSld>
+  <p:clrMapOvr>
+    <a:masterClrMapping/>
+  </p:clrMapOvr>
+</p:sld>
+</file>
+
+<file path=ppt/slides/slide11.xml><?xml version="1.0" encoding="utf-8"?>
+<p:sld xmlns:a="http://schemas.openxmlformats.org/drawingml/2006/main" xmlns:r="http://schemas.openxmlformats.org/officeDocument/2006/relationships" xmlns:p="http://schemas.openxmlformats.org/presentationml/2006/main">
+  <p:cSld>
+    <p:bg>
+      <p:bgPr>
+        <a:solidFill>
+          <a:schemeClr val="bg1"/>
+        </a:solidFill>
+        <a:effectLst/>
+      </p:bgPr>
+    </p:bg>
+    <p:spTree>
+      <p:nvGrpSpPr>
+        <p:cNvPr id="1" name=""/>
+        <p:cNvGrpSpPr/>
+        <p:nvPr/>
+      </p:nvGrpSpPr>
+      <p:grpSpPr>
+        <a:xfrm>
+          <a:off x="0" y="0"/>
+          <a:ext cx="0" cy="0"/>
+          <a:chOff x="0" y="0"/>
+          <a:chExt cx="0" cy="0"/>
+        </a:xfrm>
+      </p:grpSpPr>
       <p:sp useBgFill="1">
         <p:nvSpPr>
           <p:cNvPr id="20" name="Rectangle 8">
@@ -8815,7 +9761,7 @@
                   <a:spcPts val="600"/>
                 </a:spcAft>
               </a:pPr>
-              <a:t>10</a:t>
+              <a:t>11</a:t>
             </a:fld>
             <a:endParaRPr lang="en-US"/>
           </a:p>
@@ -8834,7 +9780,7 @@
 </p:sld>
 </file>
 
-<file path=ppt/slides/slide11.xml><?xml version="1.0" encoding="utf-8"?>
+<file path=ppt/slides/slide12.xml><?xml version="1.0" encoding="utf-8"?>
 <p:sld xmlns:a="http://schemas.openxmlformats.org/drawingml/2006/main" xmlns:r="http://schemas.openxmlformats.org/officeDocument/2006/relationships" xmlns:p="http://schemas.openxmlformats.org/presentationml/2006/main">
   <p:cSld>
     <p:bg>
@@ -9345,7 +10291,7 @@
                   <a:spcPts val="600"/>
                 </a:spcAft>
               </a:pPr>
-              <a:t>11</a:t>
+              <a:t>12</a:t>
             </a:fld>
             <a:endParaRPr lang="en-US"/>
           </a:p>
@@ -9429,7 +10375,7 @@
 </p:sld>
 </file>
 
-<file path=ppt/slides/slide12.xml><?xml version="1.0" encoding="utf-8"?>
+<file path=ppt/slides/slide13.xml><?xml version="1.0" encoding="utf-8"?>
 <p:sld xmlns:a="http://schemas.openxmlformats.org/drawingml/2006/main" xmlns:r="http://schemas.openxmlformats.org/officeDocument/2006/relationships" xmlns:p="http://schemas.openxmlformats.org/presentationml/2006/main">
   <p:cSld>
     <p:bg>
@@ -10009,7 +10955,7 @@
                   <a:spcPts val="600"/>
                 </a:spcAft>
               </a:pPr>
-              <a:t>12</a:t>
+              <a:t>13</a:t>
             </a:fld>
             <a:endParaRPr lang="en-US">
               <a:solidFill>
@@ -13043,13 +13989,13 @@
         <p:spPr/>
         <p:txBody>
           <a:bodyPr anchor="b">
-            <a:normAutofit fontScale="90000"/>
+            <a:normAutofit/>
           </a:bodyPr>
           <a:lstStyle/>
           <a:p>
             <a:r>
               <a:rPr lang="cs-CZ" sz="5400" dirty="0"/>
-              <a:t>Cyklus s neznámým počtem opakování </a:t>
+              <a:t>Rozhodovací blok</a:t>
             </a:r>
           </a:p>
         </p:txBody>
@@ -13136,45 +14082,33 @@
         </p:spPr>
         <p:txBody>
           <a:bodyPr>
-            <a:normAutofit/>
+            <a:normAutofit fontScale="92500" lnSpcReduction="10000"/>
           </a:bodyPr>
           <a:lstStyle/>
           <a:p>
             <a:pPr marL="0" indent="0">
               <a:buNone/>
             </a:pPr>
-            <a:r>
-              <a:rPr lang="cs-CZ" sz="1600" dirty="0" err="1">
+            <a:br>
+              <a:rPr lang="cs-CZ" sz="2400" dirty="0"/>
+            </a:br>
+            <a:r>
+              <a:rPr lang="cs-CZ" sz="2400" dirty="0" err="1">
                 <a:solidFill>
                   <a:srgbClr val="0000FF"/>
                 </a:solidFill>
                 <a:latin typeface="Consolas" panose="020B0609020204030204" pitchFamily="49" charset="0"/>
               </a:rPr>
-              <a:t>while</a:t>
-            </a:r>
-            <a:r>
-              <a:rPr lang="cs-CZ" sz="1600" dirty="0">
-                <a:solidFill>
-                  <a:srgbClr val="0000FF"/>
-                </a:solidFill>
-                <a:latin typeface="Consolas" panose="020B0609020204030204" pitchFamily="49" charset="0"/>
-              </a:rPr>
-              <a:t> </a:t>
-            </a:r>
-            <a:r>
-              <a:rPr lang="cs-CZ" sz="1600" dirty="0">
-                <a:latin typeface="Consolas" panose="020B0609020204030204" pitchFamily="49" charset="0"/>
-              </a:rPr>
-              <a:t>(</a:t>
-            </a:r>
-            <a:r>
-              <a:rPr lang="cs-CZ" sz="1600" dirty="0">
+              <a:t>if</a:t>
+            </a:r>
+            <a:r>
+              <a:rPr lang="cs-CZ" sz="2400" dirty="0">
                 <a:solidFill>
                   <a:srgbClr val="000000"/>
                 </a:solidFill>
                 <a:latin typeface="Consolas" panose="020B0609020204030204" pitchFamily="49" charset="0"/>
               </a:rPr>
-              <a:t>PODMÍNKA)</a:t>
+              <a:t> (PODMÍNKA)</a:t>
             </a:r>
           </a:p>
           <a:p>
@@ -13182,7 +14116,7 @@
               <a:buNone/>
             </a:pPr>
             <a:r>
-              <a:rPr lang="cs-CZ" sz="1600" dirty="0">
+              <a:rPr lang="cs-CZ" sz="2400" dirty="0">
                 <a:solidFill>
                   <a:srgbClr val="000000"/>
                 </a:solidFill>
@@ -13196,7 +14130,7 @@
               <a:buNone/>
             </a:pPr>
             <a:r>
-              <a:rPr lang="cs-CZ" sz="1600" dirty="0">
+              <a:rPr lang="cs-CZ" sz="2400" dirty="0">
                 <a:solidFill>
                   <a:srgbClr val="000000"/>
                 </a:solidFill>
@@ -13205,15 +14139,15 @@
               <a:t>    </a:t>
             </a:r>
             <a:r>
-              <a:rPr lang="cs-CZ" sz="1600" dirty="0">
+              <a:rPr lang="cs-CZ" sz="2400" dirty="0">
                 <a:solidFill>
                   <a:srgbClr val="008000"/>
                 </a:solidFill>
                 <a:latin typeface="Consolas" panose="020B0609020204030204" pitchFamily="49" charset="0"/>
               </a:rPr>
-              <a:t>// POKUD JE PODMÍNKA SPLNĚNA</a:t>
-            </a:r>
-            <a:endParaRPr lang="cs-CZ" sz="1600" dirty="0">
+              <a:t>// POKUD JE PODMÍNKA SPLNĚNÁ</a:t>
+            </a:r>
+            <a:endParaRPr lang="cs-CZ" sz="2400" dirty="0">
               <a:solidFill>
                 <a:srgbClr val="000000"/>
               </a:solidFill>
@@ -13225,7 +14159,7 @@
               <a:buNone/>
             </a:pPr>
             <a:r>
-              <a:rPr lang="cs-CZ" sz="1600" dirty="0">
+              <a:rPr lang="cs-CZ" sz="2400" dirty="0">
                 <a:solidFill>
                   <a:srgbClr val="000000"/>
                 </a:solidFill>
@@ -13235,13 +14169,82 @@
             </a:r>
           </a:p>
           <a:p>
-            <a:endParaRPr lang="cs-CZ" sz="2400" dirty="0"/>
-          </a:p>
-          <a:p>
-            <a:r>
-              <a:rPr lang="cs-CZ" sz="2400" dirty="0"/>
-              <a:t>Kód v cyklu se nemusí provést, pokud při první kontrole podmínka není splněna</a:t>
-            </a:r>
+            <a:pPr marL="0" indent="0">
+              <a:buNone/>
+            </a:pPr>
+            <a:r>
+              <a:rPr lang="cs-CZ" sz="2400" dirty="0" err="1">
+                <a:solidFill>
+                  <a:srgbClr val="0000FF"/>
+                </a:solidFill>
+                <a:latin typeface="Consolas" panose="020B0609020204030204" pitchFamily="49" charset="0"/>
+              </a:rPr>
+              <a:t>else</a:t>
+            </a:r>
+            <a:endParaRPr lang="cs-CZ" sz="2400" dirty="0">
+              <a:solidFill>
+                <a:srgbClr val="000000"/>
+              </a:solidFill>
+              <a:latin typeface="Consolas" panose="020B0609020204030204" pitchFamily="49" charset="0"/>
+            </a:endParaRPr>
+          </a:p>
+          <a:p>
+            <a:pPr marL="0" indent="0">
+              <a:buNone/>
+            </a:pPr>
+            <a:r>
+              <a:rPr lang="cs-CZ" sz="2400" dirty="0">
+                <a:solidFill>
+                  <a:srgbClr val="000000"/>
+                </a:solidFill>
+                <a:latin typeface="Consolas" panose="020B0609020204030204" pitchFamily="49" charset="0"/>
+              </a:rPr>
+              <a:t>   {</a:t>
+            </a:r>
+          </a:p>
+          <a:p>
+            <a:pPr marL="0" indent="0">
+              <a:buNone/>
+            </a:pPr>
+            <a:r>
+              <a:rPr lang="cs-CZ" sz="2400" dirty="0">
+                <a:solidFill>
+                  <a:srgbClr val="000000"/>
+                </a:solidFill>
+                <a:latin typeface="Consolas" panose="020B0609020204030204" pitchFamily="49" charset="0"/>
+              </a:rPr>
+              <a:t>   </a:t>
+            </a:r>
+            <a:r>
+              <a:rPr lang="cs-CZ" sz="2400" dirty="0">
+                <a:solidFill>
+                  <a:srgbClr val="008000"/>
+                </a:solidFill>
+                <a:latin typeface="Consolas" panose="020B0609020204030204" pitchFamily="49" charset="0"/>
+              </a:rPr>
+              <a:t>// POKUD PODMÍNKA NENÍ SPLNĚNA</a:t>
+            </a:r>
+            <a:endParaRPr lang="cs-CZ" sz="2400" dirty="0">
+              <a:solidFill>
+                <a:srgbClr val="000000"/>
+              </a:solidFill>
+              <a:latin typeface="Consolas" panose="020B0609020204030204" pitchFamily="49" charset="0"/>
+            </a:endParaRPr>
+          </a:p>
+          <a:p>
+            <a:pPr marL="0" indent="0">
+              <a:buNone/>
+            </a:pPr>
+            <a:r>
+              <a:rPr lang="cs-CZ" sz="2400" dirty="0">
+                <a:solidFill>
+                  <a:srgbClr val="000000"/>
+                </a:solidFill>
+                <a:latin typeface="Consolas" panose="020B0609020204030204" pitchFamily="49" charset="0"/>
+              </a:rPr>
+              <a:t>   }</a:t>
+            </a:r>
+            <a:endParaRPr lang="cs-CZ" sz="1600" dirty="0"/>
           </a:p>
         </p:txBody>
       </p:sp>
@@ -13343,7 +14346,7 @@
           <a:lstStyle/>
           <a:p>
             <a:pPr algn="ctr"/>
-            <a:endParaRPr lang="cs-CZ"/>
+            <a:endParaRPr lang="cs-CZ" dirty="0"/>
           </a:p>
         </p:txBody>
       </p:sp>
@@ -13470,7 +14473,7 @@
         <p:spPr/>
         <p:txBody>
           <a:bodyPr>
-            <a:normAutofit/>
+            <a:normAutofit fontScale="92500" lnSpcReduction="10000"/>
           </a:bodyPr>
           <a:lstStyle/>
           <a:p>
@@ -13489,22 +14492,19 @@
             <a:endParaRPr lang="cs-CZ" dirty="0"/>
           </a:p>
           <a:p>
-            <a:endParaRPr lang="cs-CZ" dirty="0"/>
-          </a:p>
-          <a:p>
             <a:r>
               <a:rPr lang="cs-CZ" dirty="0"/>
-              <a:t>Podmínka na začátku</a:t>
+              <a:t>Podmínka musí být pravda/nepravda</a:t>
             </a:r>
           </a:p>
         </p:txBody>
       </p:sp>
       <p:pic>
         <p:nvPicPr>
-          <p:cNvPr id="15" name="Obrázek 14">
-            <a:extLst>
-              <a:ext uri="{FF2B5EF4-FFF2-40B4-BE49-F238E27FC236}">
-                <a16:creationId xmlns:a16="http://schemas.microsoft.com/office/drawing/2014/main" id="{1DB3DDEC-1CE8-F769-3E32-A730D68DF7DA}"/>
+          <p:cNvPr id="10" name="Zástupný obsah 8">
+            <a:extLst>
+              <a:ext uri="{FF2B5EF4-FFF2-40B4-BE49-F238E27FC236}">
+                <a16:creationId xmlns:a16="http://schemas.microsoft.com/office/drawing/2014/main" id="{EB6FE43C-F638-6048-27D2-54AE6ABAFC52}"/>
               </a:ext>
             </a:extLst>
           </p:cNvPr>
@@ -13521,8 +14521,8 @@
         </p:blipFill>
         <p:spPr>
           <a:xfrm>
-            <a:off x="1578001" y="2619794"/>
-            <a:ext cx="3114675" cy="2981325"/>
+            <a:off x="839788" y="2621655"/>
+            <a:ext cx="4184650" cy="2012751"/>
           </a:xfrm>
           <a:prstGeom prst="rect">
             <a:avLst/>
@@ -13532,7 +14532,7 @@
     </p:spTree>
     <p:extLst>
       <p:ext uri="{BB962C8B-B14F-4D97-AF65-F5344CB8AC3E}">
-        <p14:creationId xmlns:p14="http://schemas.microsoft.com/office/powerpoint/2010/main" val="1009635360"/>
+        <p14:creationId xmlns:p14="http://schemas.microsoft.com/office/powerpoint/2010/main" val="2131364446"/>
       </p:ext>
     </p:extLst>
   </p:cSld>
@@ -13748,19 +14748,29 @@
               <a:buNone/>
             </a:pPr>
             <a:r>
+              <a:rPr lang="cs-CZ" sz="1600" dirty="0" err="1">
+                <a:solidFill>
+                  <a:srgbClr val="0000FF"/>
+                </a:solidFill>
+                <a:latin typeface="Consolas" panose="020B0609020204030204" pitchFamily="49" charset="0"/>
+              </a:rPr>
+              <a:t>while</a:t>
+            </a:r>
+            <a:r>
               <a:rPr lang="cs-CZ" sz="1600" dirty="0">
                 <a:solidFill>
                   <a:srgbClr val="0000FF"/>
                 </a:solidFill>
                 <a:latin typeface="Consolas" panose="020B0609020204030204" pitchFamily="49" charset="0"/>
               </a:rPr>
-              <a:t>do</a:t>
-            </a:r>
-          </a:p>
-          <a:p>
-            <a:pPr marL="0" indent="0">
-              <a:buNone/>
-            </a:pPr>
+              <a:t> </a:t>
+            </a:r>
+            <a:r>
+              <a:rPr lang="cs-CZ" sz="1600" dirty="0">
+                <a:latin typeface="Consolas" panose="020B0609020204030204" pitchFamily="49" charset="0"/>
+              </a:rPr>
+              <a:t>(</a:t>
+            </a:r>
             <a:r>
               <a:rPr lang="cs-CZ" sz="1600" dirty="0">
                 <a:solidFill>
@@ -13768,7 +14778,21 @@
                 </a:solidFill>
                 <a:latin typeface="Consolas" panose="020B0609020204030204" pitchFamily="49" charset="0"/>
               </a:rPr>
-              <a:t>{                </a:t>
+              <a:t>PODMÍNKA)</a:t>
+            </a:r>
+          </a:p>
+          <a:p>
+            <a:pPr marL="0" indent="0">
+              <a:buNone/>
+            </a:pPr>
+            <a:r>
+              <a:rPr lang="cs-CZ" sz="1600" dirty="0">
+                <a:solidFill>
+                  <a:srgbClr val="000000"/>
+                </a:solidFill>
+                <a:latin typeface="Consolas" panose="020B0609020204030204" pitchFamily="49" charset="0"/>
+              </a:rPr>
+              <a:t>   {                </a:t>
             </a:r>
           </a:p>
           <a:p>
@@ -13791,7 +14815,7 @@
                 </a:solidFill>
                 <a:latin typeface="Consolas" panose="020B0609020204030204" pitchFamily="49" charset="0"/>
               </a:rPr>
-              <a:t>// POKUD JE PODMÍNKA SPLNĚNÁ</a:t>
+              <a:t>// POKUD JE PODMÍNKA SPLNĚNA</a:t>
             </a:r>
             <a:endParaRPr lang="cs-CZ" sz="1600" dirty="0">
               <a:solidFill>
@@ -13811,34 +14835,7 @@
                 </a:solidFill>
                 <a:latin typeface="Consolas" panose="020B0609020204030204" pitchFamily="49" charset="0"/>
               </a:rPr>
-              <a:t>}</a:t>
-            </a:r>
-            <a:r>
-              <a:rPr lang="cs-CZ" sz="1600" dirty="0">
-                <a:solidFill>
-                  <a:srgbClr val="0000FF"/>
-                </a:solidFill>
-                <a:latin typeface="Consolas" panose="020B0609020204030204" pitchFamily="49" charset="0"/>
-              </a:rPr>
-              <a:t> </a:t>
-            </a:r>
-            <a:r>
-              <a:rPr lang="cs-CZ" sz="1600" dirty="0" err="1">
-                <a:solidFill>
-                  <a:srgbClr val="0000FF"/>
-                </a:solidFill>
-                <a:latin typeface="Consolas" panose="020B0609020204030204" pitchFamily="49" charset="0"/>
-              </a:rPr>
-              <a:t>while</a:t>
-            </a:r>
-            <a:r>
-              <a:rPr lang="cs-CZ" sz="1600" dirty="0">
-                <a:solidFill>
-                  <a:srgbClr val="000000"/>
-                </a:solidFill>
-                <a:latin typeface="Consolas" panose="020B0609020204030204" pitchFamily="49" charset="0"/>
-              </a:rPr>
-              <a:t>(PODMÍNKA);</a:t>
+              <a:t>   }</a:t>
             </a:r>
           </a:p>
           <a:p>
@@ -13847,13 +14844,7 @@
           <a:p>
             <a:r>
               <a:rPr lang="cs-CZ" sz="2400" dirty="0"/>
-              <a:t>Kód v cyklu se vždy alespoň jednou vykoná</a:t>
-            </a:r>
-          </a:p>
-          <a:p>
-            <a:r>
-              <a:rPr lang="cs-CZ" sz="2400" dirty="0"/>
-              <a:t>Další opakování závisí na splnění podmínky</a:t>
+              <a:t>Kód v cyklu se nemusí provést, pokud při první kontrole podmínka není splněna</a:t>
             </a:r>
           </a:p>
         </p:txBody>
@@ -14107,17 +15098,17 @@
           <a:p>
             <a:r>
               <a:rPr lang="cs-CZ" dirty="0"/>
-              <a:t>Podmínka na konci</a:t>
+              <a:t>Podmínka na začátku</a:t>
             </a:r>
           </a:p>
         </p:txBody>
       </p:sp>
       <p:pic>
         <p:nvPicPr>
-          <p:cNvPr id="7" name="Obrázek 6">
-            <a:extLst>
-              <a:ext uri="{FF2B5EF4-FFF2-40B4-BE49-F238E27FC236}">
-                <a16:creationId xmlns:a16="http://schemas.microsoft.com/office/drawing/2014/main" id="{9B1EE6F4-97CD-6E6B-B1C2-A7452753857C}"/>
+          <p:cNvPr id="15" name="Obrázek 14">
+            <a:extLst>
+              <a:ext uri="{FF2B5EF4-FFF2-40B4-BE49-F238E27FC236}">
+                <a16:creationId xmlns:a16="http://schemas.microsoft.com/office/drawing/2014/main" id="{1DB3DDEC-1CE8-F769-3E32-A730D68DF7DA}"/>
               </a:ext>
             </a:extLst>
           </p:cNvPr>
@@ -14134,8 +15125,8 @@
         </p:blipFill>
         <p:spPr>
           <a:xfrm>
-            <a:off x="1550613" y="2505073"/>
-            <a:ext cx="2366963" cy="3147280"/>
+            <a:off x="1578001" y="2619794"/>
+            <a:ext cx="3114675" cy="2981325"/>
           </a:xfrm>
           <a:prstGeom prst="rect">
             <a:avLst/>
@@ -14145,7 +15136,7 @@
     </p:spTree>
     <p:extLst>
       <p:ext uri="{BB962C8B-B14F-4D97-AF65-F5344CB8AC3E}">
-        <p14:creationId xmlns:p14="http://schemas.microsoft.com/office/powerpoint/2010/main" val="418479960"/>
+        <p14:creationId xmlns:p14="http://schemas.microsoft.com/office/powerpoint/2010/main" val="1009635360"/>
       </p:ext>
     </p:extLst>
   </p:cSld>
@@ -14260,13 +15251,13 @@
         <p:spPr/>
         <p:txBody>
           <a:bodyPr anchor="b">
-            <a:normAutofit/>
+            <a:normAutofit fontScale="90000"/>
           </a:bodyPr>
           <a:lstStyle/>
           <a:p>
             <a:r>
               <a:rPr lang="cs-CZ" sz="5400" dirty="0"/>
-              <a:t>Cyklus s pevným počtem opakování</a:t>
+              <a:t>Cyklus s neznámým počtem opakování </a:t>
             </a:r>
           </a:p>
         </p:txBody>
@@ -14360,47 +15351,71 @@
             <a:pPr marL="0" indent="0">
               <a:buNone/>
             </a:pPr>
-            <a:endParaRPr lang="cs-CZ" sz="1600" dirty="0">
-              <a:solidFill>
-                <a:srgbClr val="0000FF"/>
-              </a:solidFill>
-              <a:latin typeface="Consolas" panose="020B0609020204030204" pitchFamily="49" charset="0"/>
-            </a:endParaRPr>
-          </a:p>
-          <a:p>
-            <a:pPr marL="0" indent="0">
-              <a:buNone/>
-            </a:pPr>
-            <a:endParaRPr lang="cs-CZ" sz="1600" dirty="0">
-              <a:solidFill>
-                <a:srgbClr val="0000FF"/>
-              </a:solidFill>
-              <a:latin typeface="Consolas" panose="020B0609020204030204" pitchFamily="49" charset="0"/>
-            </a:endParaRPr>
-          </a:p>
-          <a:p>
-            <a:pPr marL="0" indent="0">
-              <a:buNone/>
-            </a:pPr>
-            <a:endParaRPr lang="cs-CZ" sz="1600" dirty="0">
-              <a:solidFill>
-                <a:srgbClr val="0000FF"/>
-              </a:solidFill>
-              <a:latin typeface="Consolas" panose="020B0609020204030204" pitchFamily="49" charset="0"/>
-            </a:endParaRPr>
-          </a:p>
-          <a:p>
-            <a:pPr marL="0" indent="0">
-              <a:buNone/>
-            </a:pPr>
-            <a:r>
-              <a:rPr lang="cs-CZ" sz="1600" dirty="0" err="1">
+            <a:r>
+              <a:rPr lang="cs-CZ" sz="1600" dirty="0">
                 <a:solidFill>
                   <a:srgbClr val="0000FF"/>
                 </a:solidFill>
                 <a:latin typeface="Consolas" panose="020B0609020204030204" pitchFamily="49" charset="0"/>
               </a:rPr>
-              <a:t>for</a:t>
+              <a:t>do</a:t>
+            </a:r>
+          </a:p>
+          <a:p>
+            <a:pPr marL="0" indent="0">
+              <a:buNone/>
+            </a:pPr>
+            <a:r>
+              <a:rPr lang="cs-CZ" sz="1600" dirty="0">
+                <a:solidFill>
+                  <a:srgbClr val="000000"/>
+                </a:solidFill>
+                <a:latin typeface="Consolas" panose="020B0609020204030204" pitchFamily="49" charset="0"/>
+              </a:rPr>
+              <a:t>{                </a:t>
+            </a:r>
+          </a:p>
+          <a:p>
+            <a:pPr marL="0" indent="0">
+              <a:buNone/>
+            </a:pPr>
+            <a:r>
+              <a:rPr lang="cs-CZ" sz="1600" dirty="0">
+                <a:solidFill>
+                  <a:srgbClr val="000000"/>
+                </a:solidFill>
+                <a:latin typeface="Consolas" panose="020B0609020204030204" pitchFamily="49" charset="0"/>
+              </a:rPr>
+              <a:t>    </a:t>
+            </a:r>
+            <a:r>
+              <a:rPr lang="cs-CZ" sz="1600" dirty="0">
+                <a:solidFill>
+                  <a:srgbClr val="008000"/>
+                </a:solidFill>
+                <a:latin typeface="Consolas" panose="020B0609020204030204" pitchFamily="49" charset="0"/>
+              </a:rPr>
+              <a:t>// POKUD JE PODMÍNKA SPLNĚNÁ</a:t>
+            </a:r>
+            <a:endParaRPr lang="cs-CZ" sz="1600" dirty="0">
+              <a:solidFill>
+                <a:srgbClr val="000000"/>
+              </a:solidFill>
+              <a:latin typeface="Consolas" panose="020B0609020204030204" pitchFamily="49" charset="0"/>
+            </a:endParaRPr>
+          </a:p>
+          <a:p>
+            <a:pPr marL="0" indent="0">
+              <a:buNone/>
+            </a:pPr>
+            <a:r>
+              <a:rPr lang="cs-CZ" sz="1600" dirty="0">
+                <a:solidFill>
+                  <a:srgbClr val="000000"/>
+                </a:solidFill>
+                <a:latin typeface="Consolas" panose="020B0609020204030204" pitchFamily="49" charset="0"/>
+              </a:rPr>
+              <a:t>}</a:t>
             </a:r>
             <a:r>
               <a:rPr lang="cs-CZ" sz="1600" dirty="0">
@@ -14412,134 +15427,38 @@
               <a:t> </a:t>
             </a:r>
             <a:r>
+              <a:rPr lang="cs-CZ" sz="1600" dirty="0" err="1">
+                <a:solidFill>
+                  <a:srgbClr val="0000FF"/>
+                </a:solidFill>
+                <a:latin typeface="Consolas" panose="020B0609020204030204" pitchFamily="49" charset="0"/>
+              </a:rPr>
+              <a:t>while</a:t>
+            </a:r>
+            <a:r>
               <a:rPr lang="cs-CZ" sz="1600" dirty="0">
                 <a:solidFill>
                   <a:srgbClr val="000000"/>
                 </a:solidFill>
                 <a:latin typeface="Consolas" panose="020B0609020204030204" pitchFamily="49" charset="0"/>
               </a:rPr>
-              <a:t>(</a:t>
-            </a:r>
-            <a:r>
-              <a:rPr lang="cs-CZ" sz="1600" dirty="0" err="1">
-                <a:solidFill>
-                  <a:srgbClr val="000000"/>
-                </a:solidFill>
-                <a:latin typeface="Consolas" panose="020B0609020204030204" pitchFamily="49" charset="0"/>
-              </a:rPr>
-              <a:t>int</a:t>
-            </a:r>
-            <a:r>
-              <a:rPr lang="cs-CZ" sz="1600" dirty="0">
-                <a:solidFill>
-                  <a:srgbClr val="000000"/>
-                </a:solidFill>
-                <a:latin typeface="Consolas" panose="020B0609020204030204" pitchFamily="49" charset="0"/>
-              </a:rPr>
-              <a:t> i = 0; i &lt; N; i++)</a:t>
-            </a:r>
-            <a:endParaRPr lang="cs-CZ" sz="1600" dirty="0">
-              <a:solidFill>
-                <a:srgbClr val="0000FF"/>
-              </a:solidFill>
-              <a:latin typeface="Consolas" panose="020B0609020204030204" pitchFamily="49" charset="0"/>
-            </a:endParaRPr>
-          </a:p>
-          <a:p>
-            <a:pPr marL="0" indent="0">
-              <a:buNone/>
-            </a:pPr>
-            <a:r>
-              <a:rPr lang="cs-CZ" sz="1600" dirty="0">
-                <a:solidFill>
-                  <a:srgbClr val="000000"/>
-                </a:solidFill>
-                <a:latin typeface="Consolas" panose="020B0609020204030204" pitchFamily="49" charset="0"/>
-              </a:rPr>
-              <a:t>{  </a:t>
-            </a:r>
-          </a:p>
-          <a:p>
-            <a:pPr marL="0" indent="0">
-              <a:buNone/>
-            </a:pPr>
-            <a:endParaRPr lang="cs-CZ" sz="1600" dirty="0">
-              <a:solidFill>
-                <a:srgbClr val="000000"/>
-              </a:solidFill>
-              <a:latin typeface="Consolas" panose="020B0609020204030204" pitchFamily="49" charset="0"/>
-            </a:endParaRPr>
-          </a:p>
-          <a:p>
-            <a:pPr marL="0" indent="0">
-              <a:buNone/>
-            </a:pPr>
-            <a:endParaRPr lang="cs-CZ" sz="1600" dirty="0">
-              <a:solidFill>
-                <a:srgbClr val="000000"/>
-              </a:solidFill>
-              <a:latin typeface="Consolas" panose="020B0609020204030204" pitchFamily="49" charset="0"/>
-            </a:endParaRPr>
-          </a:p>
-          <a:p>
-            <a:pPr marL="0" indent="0">
-              <a:buNone/>
-            </a:pPr>
-            <a:endParaRPr lang="cs-CZ" sz="1600" dirty="0">
-              <a:solidFill>
-                <a:srgbClr val="000000"/>
-              </a:solidFill>
-              <a:latin typeface="Consolas" panose="020B0609020204030204" pitchFamily="49" charset="0"/>
-            </a:endParaRPr>
-          </a:p>
-          <a:p>
-            <a:pPr marL="0" indent="0">
-              <a:buNone/>
-            </a:pPr>
-            <a:r>
-              <a:rPr lang="cs-CZ" sz="1600" dirty="0">
-                <a:solidFill>
-                  <a:srgbClr val="000000"/>
-                </a:solidFill>
-                <a:latin typeface="Consolas" panose="020B0609020204030204" pitchFamily="49" charset="0"/>
-              </a:rPr>
-              <a:t>     </a:t>
-            </a:r>
-            <a:r>
-              <a:rPr lang="cs-CZ" sz="1600" dirty="0">
-                <a:solidFill>
-                  <a:srgbClr val="008000"/>
-                </a:solidFill>
-                <a:latin typeface="Consolas" panose="020B0609020204030204" pitchFamily="49" charset="0"/>
-              </a:rPr>
-              <a:t>// VYKONEJ</a:t>
-            </a:r>
-            <a:endParaRPr lang="cs-CZ" sz="1600" dirty="0">
-              <a:solidFill>
-                <a:srgbClr val="000000"/>
-              </a:solidFill>
-              <a:latin typeface="Consolas" panose="020B0609020204030204" pitchFamily="49" charset="0"/>
-            </a:endParaRPr>
-          </a:p>
-          <a:p>
-            <a:pPr marL="0" indent="0">
-              <a:buNone/>
-            </a:pPr>
-            <a:r>
-              <a:rPr lang="cs-CZ" sz="1600" dirty="0">
-                <a:solidFill>
-                  <a:srgbClr val="000000"/>
-                </a:solidFill>
-                <a:latin typeface="Consolas" panose="020B0609020204030204" pitchFamily="49" charset="0"/>
-              </a:rPr>
-              <a:t>}</a:t>
-            </a:r>
-          </a:p>
-          <a:p>
-            <a:pPr marL="0" indent="0">
-              <a:buNone/>
-            </a:pPr>
+              <a:t>(PODMÍNKA);</a:t>
+            </a:r>
+          </a:p>
+          <a:p>
             <a:endParaRPr lang="cs-CZ" sz="2400" dirty="0"/>
+          </a:p>
+          <a:p>
+            <a:r>
+              <a:rPr lang="cs-CZ" sz="2400" dirty="0"/>
+              <a:t>Kód v cyklu se vždy alespoň jednou vykoná</a:t>
+            </a:r>
+          </a:p>
+          <a:p>
+            <a:r>
+              <a:rPr lang="cs-CZ" sz="2400" dirty="0"/>
+              <a:t>Další opakování závisí na splnění podmínky</a:t>
+            </a:r>
           </a:p>
         </p:txBody>
       </p:sp>
@@ -14789,14 +15708,20 @@
           <a:p>
             <a:endParaRPr lang="cs-CZ" dirty="0"/>
           </a:p>
+          <a:p>
+            <a:r>
+              <a:rPr lang="cs-CZ" dirty="0"/>
+              <a:t>Podmínka na konci</a:t>
+            </a:r>
+          </a:p>
         </p:txBody>
       </p:sp>
       <p:pic>
         <p:nvPicPr>
-          <p:cNvPr id="3" name="Zástupný obsah 8">
-            <a:extLst>
-              <a:ext uri="{FF2B5EF4-FFF2-40B4-BE49-F238E27FC236}">
-                <a16:creationId xmlns:a16="http://schemas.microsoft.com/office/drawing/2014/main" id="{AB1E5F41-FBE1-C0CE-D530-05B4E39B9B87}"/>
+          <p:cNvPr id="7" name="Obrázek 6">
+            <a:extLst>
+              <a:ext uri="{FF2B5EF4-FFF2-40B4-BE49-F238E27FC236}">
+                <a16:creationId xmlns:a16="http://schemas.microsoft.com/office/drawing/2014/main" id="{9B1EE6F4-97CD-6E6B-B1C2-A7452753857C}"/>
               </a:ext>
             </a:extLst>
           </p:cNvPr>
@@ -14813,175 +15738,18 @@
         </p:blipFill>
         <p:spPr>
           <a:xfrm>
-            <a:off x="1373214" y="2938088"/>
-            <a:ext cx="3524250" cy="3028950"/>
+            <a:off x="1550613" y="2505073"/>
+            <a:ext cx="2366963" cy="3147280"/>
           </a:xfrm>
           <a:prstGeom prst="rect">
             <a:avLst/>
           </a:prstGeom>
         </p:spPr>
       </p:pic>
-      <p:sp>
-        <p:nvSpPr>
-          <p:cNvPr id="10" name="Bublinový popisek: se šipkou dolů 9">
-            <a:extLst>
-              <a:ext uri="{FF2B5EF4-FFF2-40B4-BE49-F238E27FC236}">
-                <a16:creationId xmlns:a16="http://schemas.microsoft.com/office/drawing/2014/main" id="{70B6ED33-38F1-4863-7A49-2CCF3BA022D6}"/>
-              </a:ext>
-            </a:extLst>
-          </p:cNvPr>
-          <p:cNvSpPr/>
-          <p:nvPr/>
-        </p:nvSpPr>
-        <p:spPr>
-          <a:xfrm>
-            <a:off x="6096000" y="2555266"/>
-            <a:ext cx="2357718" cy="1138193"/>
-          </a:xfrm>
-          <a:prstGeom prst="downArrowCallout">
-            <a:avLst>
-              <a:gd name="adj1" fmla="val 12398"/>
-              <a:gd name="adj2" fmla="val 16336"/>
-              <a:gd name="adj3" fmla="val 18699"/>
-              <a:gd name="adj4" fmla="val 72066"/>
-            </a:avLst>
-          </a:prstGeom>
-        </p:spPr>
-        <p:style>
-          <a:lnRef idx="2">
-            <a:schemeClr val="accent1">
-              <a:shade val="15000"/>
-            </a:schemeClr>
-          </a:lnRef>
-          <a:fillRef idx="1">
-            <a:schemeClr val="accent1"/>
-          </a:fillRef>
-          <a:effectRef idx="0">
-            <a:schemeClr val="accent1"/>
-          </a:effectRef>
-          <a:fontRef idx="minor">
-            <a:schemeClr val="lt1"/>
-          </a:fontRef>
-        </p:style>
-        <p:txBody>
-          <a:bodyPr rtlCol="0" anchor="ctr"/>
-          <a:lstStyle/>
-          <a:p>
-            <a:pPr algn="ctr"/>
-            <a:r>
-              <a:rPr lang="cs-CZ" dirty="0"/>
-              <a:t>Deklarace a inicializace řídící proměnné</a:t>
-            </a:r>
-          </a:p>
-        </p:txBody>
-      </p:sp>
-      <p:sp>
-        <p:nvSpPr>
-          <p:cNvPr id="16" name="Bublinový popisek: se šipkou nahoru 15">
-            <a:extLst>
-              <a:ext uri="{FF2B5EF4-FFF2-40B4-BE49-F238E27FC236}">
-                <a16:creationId xmlns:a16="http://schemas.microsoft.com/office/drawing/2014/main" id="{76005504-F951-BCD9-3DC9-6FA2D454F9AD}"/>
-              </a:ext>
-            </a:extLst>
-          </p:cNvPr>
-          <p:cNvSpPr/>
-          <p:nvPr/>
-        </p:nvSpPr>
-        <p:spPr>
-          <a:xfrm>
-            <a:off x="7059707" y="3942390"/>
-            <a:ext cx="2357718" cy="1051767"/>
-          </a:xfrm>
-          <a:prstGeom prst="upArrowCallout">
-            <a:avLst/>
-          </a:prstGeom>
-        </p:spPr>
-        <p:style>
-          <a:lnRef idx="2">
-            <a:schemeClr val="accent1">
-              <a:shade val="15000"/>
-            </a:schemeClr>
-          </a:lnRef>
-          <a:fillRef idx="1">
-            <a:schemeClr val="accent1"/>
-          </a:fillRef>
-          <a:effectRef idx="0">
-            <a:schemeClr val="accent1"/>
-          </a:effectRef>
-          <a:fontRef idx="minor">
-            <a:schemeClr val="lt1"/>
-          </a:fontRef>
-        </p:style>
-        <p:txBody>
-          <a:bodyPr rtlCol="0" anchor="ctr"/>
-          <a:lstStyle/>
-          <a:p>
-            <a:pPr algn="ctr"/>
-            <a:r>
-              <a:rPr lang="cs-CZ" dirty="0"/>
-              <a:t>Podmínka vztažená k řídící proměnné</a:t>
-            </a:r>
-          </a:p>
-        </p:txBody>
-      </p:sp>
-      <p:sp>
-        <p:nvSpPr>
-          <p:cNvPr id="17" name="Bublinový popisek: se šipkou doleva 16">
-            <a:extLst>
-              <a:ext uri="{FF2B5EF4-FFF2-40B4-BE49-F238E27FC236}">
-                <a16:creationId xmlns:a16="http://schemas.microsoft.com/office/drawing/2014/main" id="{73F58310-22B2-E41E-08D2-C31FC32C0ED7}"/>
-              </a:ext>
-            </a:extLst>
-          </p:cNvPr>
-          <p:cNvSpPr/>
-          <p:nvPr/>
-        </p:nvSpPr>
-        <p:spPr>
-          <a:xfrm>
-            <a:off x="9341225" y="2938088"/>
-            <a:ext cx="1846728" cy="1698650"/>
-          </a:xfrm>
-          <a:prstGeom prst="leftArrowCallout">
-            <a:avLst>
-              <a:gd name="adj1" fmla="val 17457"/>
-              <a:gd name="adj2" fmla="val 16702"/>
-              <a:gd name="adj3" fmla="val 12176"/>
-              <a:gd name="adj4" fmla="val 64977"/>
-            </a:avLst>
-          </a:prstGeom>
-        </p:spPr>
-        <p:style>
-          <a:lnRef idx="2">
-            <a:schemeClr val="accent1">
-              <a:shade val="15000"/>
-            </a:schemeClr>
-          </a:lnRef>
-          <a:fillRef idx="1">
-            <a:schemeClr val="accent1"/>
-          </a:fillRef>
-          <a:effectRef idx="0">
-            <a:schemeClr val="accent1"/>
-          </a:effectRef>
-          <a:fontRef idx="minor">
-            <a:schemeClr val="lt1"/>
-          </a:fontRef>
-        </p:style>
-        <p:txBody>
-          <a:bodyPr rtlCol="0" anchor="ctr"/>
-          <a:lstStyle/>
-          <a:p>
-            <a:pPr algn="ctr"/>
-            <a:r>
-              <a:rPr lang="cs-CZ" dirty="0"/>
-              <a:t>Editace řídící proměnné</a:t>
-            </a:r>
-          </a:p>
-        </p:txBody>
-      </p:sp>
     </p:spTree>
     <p:extLst>
       <p:ext uri="{BB962C8B-B14F-4D97-AF65-F5344CB8AC3E}">
-        <p14:creationId xmlns:p14="http://schemas.microsoft.com/office/powerpoint/2010/main" val="2141335822"/>
+        <p14:creationId xmlns:p14="http://schemas.microsoft.com/office/powerpoint/2010/main" val="418479960"/>
       </p:ext>
     </p:extLst>
   </p:cSld>

</xml_diff>